<commit_message>
Algoritmo para resolver el archivo en el process y diseños de configuración de excel
</commit_message>
<xml_diff>
--- a/designs/Designs.pptx
+++ b/designs/Designs.pptx
@@ -6,6 +6,7 @@
   </p:sldMasterIdLst>
   <p:sldIdLst>
     <p:sldId id="256" r:id="rId2"/>
+    <p:sldId id="257" r:id="rId3"/>
   </p:sldIdLst>
   <p:sldSz cx="12192000" cy="6858000"/>
   <p:notesSz cx="6858000" cy="9144000"/>
@@ -104,6 +105,11 @@
       </a:defRPr>
     </a:lvl9pPr>
   </p:defaultTextStyle>
+  <p:extLst>
+    <p:ext uri="{EFAFB233-063F-42B5-8137-9DF3F51BA10A}">
+      <p15:sldGuideLst xmlns:p15="http://schemas.microsoft.com/office/powerpoint/2012/main"/>
+    </p:ext>
+  </p:extLst>
 </p:presentation>
 </file>
 
@@ -238,7 +244,7 @@
           <a:p>
             <a:fld id="{90EF8CCF-DBDE-4852-99E4-85AC3F1F6A22}" type="datetimeFigureOut">
               <a:rPr lang="en-US" smtClean="0"/>
-              <a:t>4/14/2019</a:t>
+              <a:t>4/18/2019</a:t>
             </a:fld>
             <a:endParaRPr lang="en-US"/>
           </a:p>
@@ -408,7 +414,7 @@
           <a:p>
             <a:fld id="{90EF8CCF-DBDE-4852-99E4-85AC3F1F6A22}" type="datetimeFigureOut">
               <a:rPr lang="en-US" smtClean="0"/>
-              <a:t>4/14/2019</a:t>
+              <a:t>4/18/2019</a:t>
             </a:fld>
             <a:endParaRPr lang="en-US"/>
           </a:p>
@@ -588,7 +594,7 @@
           <a:p>
             <a:fld id="{90EF8CCF-DBDE-4852-99E4-85AC3F1F6A22}" type="datetimeFigureOut">
               <a:rPr lang="en-US" smtClean="0"/>
-              <a:t>4/14/2019</a:t>
+              <a:t>4/18/2019</a:t>
             </a:fld>
             <a:endParaRPr lang="en-US"/>
           </a:p>
@@ -758,7 +764,7 @@
           <a:p>
             <a:fld id="{90EF8CCF-DBDE-4852-99E4-85AC3F1F6A22}" type="datetimeFigureOut">
               <a:rPr lang="en-US" smtClean="0"/>
-              <a:t>4/14/2019</a:t>
+              <a:t>4/18/2019</a:t>
             </a:fld>
             <a:endParaRPr lang="en-US"/>
           </a:p>
@@ -1004,7 +1010,7 @@
           <a:p>
             <a:fld id="{90EF8CCF-DBDE-4852-99E4-85AC3F1F6A22}" type="datetimeFigureOut">
               <a:rPr lang="en-US" smtClean="0"/>
-              <a:t>4/14/2019</a:t>
+              <a:t>4/18/2019</a:t>
             </a:fld>
             <a:endParaRPr lang="en-US"/>
           </a:p>
@@ -1236,7 +1242,7 @@
           <a:p>
             <a:fld id="{90EF8CCF-DBDE-4852-99E4-85AC3F1F6A22}" type="datetimeFigureOut">
               <a:rPr lang="en-US" smtClean="0"/>
-              <a:t>4/14/2019</a:t>
+              <a:t>4/18/2019</a:t>
             </a:fld>
             <a:endParaRPr lang="en-US"/>
           </a:p>
@@ -1603,7 +1609,7 @@
           <a:p>
             <a:fld id="{90EF8CCF-DBDE-4852-99E4-85AC3F1F6A22}" type="datetimeFigureOut">
               <a:rPr lang="en-US" smtClean="0"/>
-              <a:t>4/14/2019</a:t>
+              <a:t>4/18/2019</a:t>
             </a:fld>
             <a:endParaRPr lang="en-US"/>
           </a:p>
@@ -1721,7 +1727,7 @@
           <a:p>
             <a:fld id="{90EF8CCF-DBDE-4852-99E4-85AC3F1F6A22}" type="datetimeFigureOut">
               <a:rPr lang="en-US" smtClean="0"/>
-              <a:t>4/14/2019</a:t>
+              <a:t>4/18/2019</a:t>
             </a:fld>
             <a:endParaRPr lang="en-US"/>
           </a:p>
@@ -1816,7 +1822,7 @@
           <a:p>
             <a:fld id="{90EF8CCF-DBDE-4852-99E4-85AC3F1F6A22}" type="datetimeFigureOut">
               <a:rPr lang="en-US" smtClean="0"/>
-              <a:t>4/14/2019</a:t>
+              <a:t>4/18/2019</a:t>
             </a:fld>
             <a:endParaRPr lang="en-US"/>
           </a:p>
@@ -2093,7 +2099,7 @@
           <a:p>
             <a:fld id="{90EF8CCF-DBDE-4852-99E4-85AC3F1F6A22}" type="datetimeFigureOut">
               <a:rPr lang="en-US" smtClean="0"/>
-              <a:t>4/14/2019</a:t>
+              <a:t>4/18/2019</a:t>
             </a:fld>
             <a:endParaRPr lang="en-US"/>
           </a:p>
@@ -2346,7 +2352,7 @@
           <a:p>
             <a:fld id="{90EF8CCF-DBDE-4852-99E4-85AC3F1F6A22}" type="datetimeFigureOut">
               <a:rPr lang="en-US" smtClean="0"/>
-              <a:t>4/14/2019</a:t>
+              <a:t>4/18/2019</a:t>
             </a:fld>
             <a:endParaRPr lang="en-US"/>
           </a:p>
@@ -2559,7 +2565,7 @@
           <a:p>
             <a:fld id="{90EF8CCF-DBDE-4852-99E4-85AC3F1F6A22}" type="datetimeFigureOut">
               <a:rPr lang="en-US" smtClean="0"/>
-              <a:t>4/14/2019</a:t>
+              <a:t>4/18/2019</a:t>
             </a:fld>
             <a:endParaRPr lang="en-US"/>
           </a:p>
@@ -4367,6 +4373,273 @@
 </p:sld>
 </file>
 
+<file path=ppt/slides/slide2.xml><?xml version="1.0" encoding="utf-8"?>
+<p:sld xmlns:a="http://schemas.openxmlformats.org/drawingml/2006/main" xmlns:r="http://schemas.openxmlformats.org/officeDocument/2006/relationships" xmlns:p="http://schemas.openxmlformats.org/presentationml/2006/main">
+  <p:cSld>
+    <p:spTree>
+      <p:nvGrpSpPr>
+        <p:cNvPr id="1" name=""/>
+        <p:cNvGrpSpPr/>
+        <p:nvPr/>
+      </p:nvGrpSpPr>
+      <p:grpSpPr>
+        <a:xfrm>
+          <a:off x="0" y="0"/>
+          <a:ext cx="0" cy="0"/>
+          <a:chOff x="0" y="0"/>
+          <a:chExt cx="0" cy="0"/>
+        </a:xfrm>
+      </p:grpSpPr>
+      <p:sp>
+        <p:nvSpPr>
+          <p:cNvPr id="5" name="Rectángulo 4"/>
+          <p:cNvSpPr/>
+          <p:nvPr/>
+        </p:nvSpPr>
+        <p:spPr>
+          <a:xfrm>
+            <a:off x="0" y="0"/>
+            <a:ext cx="6321000" cy="459000"/>
+          </a:xfrm>
+          <a:prstGeom prst="rect">
+            <a:avLst/>
+          </a:prstGeom>
+          <a:solidFill>
+            <a:srgbClr val="262137"/>
+          </a:solidFill>
+          <a:ln>
+            <a:noFill/>
+          </a:ln>
+        </p:spPr>
+        <p:style>
+          <a:lnRef idx="2">
+            <a:schemeClr val="accent1">
+              <a:shade val="50000"/>
+            </a:schemeClr>
+          </a:lnRef>
+          <a:fillRef idx="1">
+            <a:schemeClr val="accent1"/>
+          </a:fillRef>
+          <a:effectRef idx="0">
+            <a:schemeClr val="accent1"/>
+          </a:effectRef>
+          <a:fontRef idx="minor">
+            <a:schemeClr val="lt1"/>
+          </a:fontRef>
+        </p:style>
+        <p:txBody>
+          <a:bodyPr rtlCol="0" anchor="ctr"/>
+          <a:lstStyle/>
+          <a:p>
+            <a:pPr algn="ctr"/>
+            <a:endParaRPr lang="en-US"/>
+          </a:p>
+        </p:txBody>
+      </p:sp>
+      <p:pic>
+        <p:nvPicPr>
+          <p:cNvPr id="1026" name="Picture 2" descr="http://www.quipux.com/img/assets/logo-quipux.png"/>
+          <p:cNvPicPr>
+            <a:picLocks noChangeAspect="1" noChangeArrowheads="1"/>
+          </p:cNvPicPr>
+          <p:nvPr/>
+        </p:nvPicPr>
+        <p:blipFill>
+          <a:blip r:embed="rId2">
+            <a:extLst>
+              <a:ext uri="{28A0092B-C50C-407E-A947-70E740481C1C}">
+                <a14:useLocalDpi xmlns:a14="http://schemas.microsoft.com/office/drawing/2010/main" val="0"/>
+              </a:ext>
+            </a:extLst>
+          </a:blip>
+          <a:srcRect/>
+          <a:stretch>
+            <a:fillRect/>
+          </a:stretch>
+        </p:blipFill>
+        <p:spPr bwMode="auto">
+          <a:xfrm>
+            <a:off x="156000" y="99000"/>
+            <a:ext cx="1487997" cy="270000"/>
+          </a:xfrm>
+          <a:prstGeom prst="rect">
+            <a:avLst/>
+          </a:prstGeom>
+          <a:noFill/>
+          <a:extLst>
+            <a:ext uri="{909E8E84-426E-40DD-AFC4-6F175D3DCCD1}">
+              <a14:hiddenFill xmlns:a14="http://schemas.microsoft.com/office/drawing/2010/main">
+                <a:solidFill>
+                  <a:srgbClr val="FFFFFF"/>
+                </a:solidFill>
+              </a14:hiddenFill>
+            </a:ext>
+          </a:extLst>
+        </p:spPr>
+      </p:pic>
+      <p:pic>
+        <p:nvPicPr>
+          <p:cNvPr id="4" name="Imagen 3"/>
+          <p:cNvPicPr>
+            <a:picLocks noChangeAspect="1"/>
+          </p:cNvPicPr>
+          <p:nvPr/>
+        </p:nvPicPr>
+        <p:blipFill>
+          <a:blip r:embed="rId3"/>
+          <a:stretch>
+            <a:fillRect/>
+          </a:stretch>
+        </p:blipFill>
+        <p:spPr>
+          <a:xfrm>
+            <a:off x="5871000" y="4464000"/>
+            <a:ext cx="342900" cy="361950"/>
+          </a:xfrm>
+          <a:prstGeom prst="rect">
+            <a:avLst/>
+          </a:prstGeom>
+        </p:spPr>
+      </p:pic>
+      <p:sp>
+        <p:nvSpPr>
+          <p:cNvPr id="7" name="CuadroTexto 6"/>
+          <p:cNvSpPr txBox="1"/>
+          <p:nvPr/>
+        </p:nvSpPr>
+        <p:spPr>
+          <a:xfrm>
+            <a:off x="3576000" y="58890"/>
+            <a:ext cx="2700000" cy="400110"/>
+          </a:xfrm>
+          <a:prstGeom prst="rect">
+            <a:avLst/>
+          </a:prstGeom>
+          <a:noFill/>
+        </p:spPr>
+        <p:txBody>
+          <a:bodyPr wrap="square" rtlCol="0">
+            <a:spAutoFit/>
+          </a:bodyPr>
+          <a:lstStyle/>
+          <a:p>
+            <a:r>
+              <a:rPr lang="es-ES" sz="2000" dirty="0" smtClean="0">
+                <a:solidFill>
+                  <a:srgbClr val="E1E71B"/>
+                </a:solidFill>
+                <a:latin typeface="Lato" panose="020F0502020204030203" pitchFamily="34" charset="0"/>
+              </a:rPr>
+              <a:t>Gesti</a:t>
+            </a:r>
+            <a:r>
+              <a:rPr lang="es-ES" sz="2000" dirty="0" smtClean="0">
+                <a:solidFill>
+                  <a:srgbClr val="E1E71B"/>
+                </a:solidFill>
+                <a:latin typeface="Lato" panose="020F0502020204030203" pitchFamily="34" charset="0"/>
+              </a:rPr>
+              <a:t>ón de novedades</a:t>
+            </a:r>
+            <a:endParaRPr lang="en-US" sz="2000" dirty="0">
+              <a:solidFill>
+                <a:srgbClr val="E1E71B"/>
+              </a:solidFill>
+              <a:latin typeface="Lato" panose="020F0502020204030203" pitchFamily="34" charset="0"/>
+            </a:endParaRPr>
+          </a:p>
+        </p:txBody>
+      </p:sp>
+      <p:sp>
+        <p:nvSpPr>
+          <p:cNvPr id="8" name="Rectángulo 7"/>
+          <p:cNvSpPr/>
+          <p:nvPr/>
+        </p:nvSpPr>
+        <p:spPr>
+          <a:xfrm>
+            <a:off x="66000" y="3159000"/>
+            <a:ext cx="324000" cy="765000"/>
+          </a:xfrm>
+          <a:prstGeom prst="rect">
+            <a:avLst/>
+          </a:prstGeom>
+          <a:solidFill>
+            <a:srgbClr val="E1E71B"/>
+          </a:solidFill>
+          <a:ln>
+            <a:noFill/>
+          </a:ln>
+        </p:spPr>
+        <p:style>
+          <a:lnRef idx="2">
+            <a:schemeClr val="accent1">
+              <a:shade val="50000"/>
+            </a:schemeClr>
+          </a:lnRef>
+          <a:fillRef idx="1">
+            <a:schemeClr val="accent1"/>
+          </a:fillRef>
+          <a:effectRef idx="0">
+            <a:schemeClr val="accent1"/>
+          </a:effectRef>
+          <a:fontRef idx="minor">
+            <a:schemeClr val="lt1"/>
+          </a:fontRef>
+        </p:style>
+        <p:txBody>
+          <a:bodyPr rtlCol="0" anchor="ctr"/>
+          <a:lstStyle/>
+          <a:p>
+            <a:pPr algn="ctr"/>
+            <a:endParaRPr lang="en-US"/>
+          </a:p>
+        </p:txBody>
+      </p:sp>
+      <p:pic>
+        <p:nvPicPr>
+          <p:cNvPr id="6" name="Imagen 5"/>
+          <p:cNvPicPr>
+            <a:picLocks noChangeAspect="1"/>
+          </p:cNvPicPr>
+          <p:nvPr/>
+        </p:nvPicPr>
+        <p:blipFill>
+          <a:blip r:embed="rId4"/>
+          <a:stretch>
+            <a:fillRect/>
+          </a:stretch>
+        </p:blipFill>
+        <p:spPr>
+          <a:xfrm>
+            <a:off x="0" y="1823486"/>
+            <a:ext cx="12192000" cy="3211028"/>
+          </a:xfrm>
+          <a:prstGeom prst="rect">
+            <a:avLst/>
+          </a:prstGeom>
+        </p:spPr>
+      </p:pic>
+    </p:spTree>
+    <p:extLst>
+      <p:ext uri="{BB962C8B-B14F-4D97-AF65-F5344CB8AC3E}">
+        <p14:creationId xmlns:p14="http://schemas.microsoft.com/office/powerpoint/2010/main" val="4206212457"/>
+      </p:ext>
+    </p:extLst>
+  </p:cSld>
+  <p:clrMapOvr>
+    <a:masterClrMapping/>
+  </p:clrMapOvr>
+  <p:timing>
+    <p:tnLst>
+      <p:par>
+        <p:cTn id="1" dur="indefinite" restart="never" nodeType="tmRoot"/>
+      </p:par>
+    </p:tnLst>
+  </p:timing>
+</p:sld>
+</file>
+
 <file path=ppt/theme/theme1.xml><?xml version="1.0" encoding="utf-8"?>
 <a:theme xmlns:a="http://schemas.openxmlformats.org/drawingml/2006/main" name="Tema de Office">
   <a:themeElements>

</xml_diff>

<commit_message>
Avances en la configuración del calendario y calculo de dias festivos
</commit_message>
<xml_diff>
--- a/designs/Designs.pptx
+++ b/designs/Designs.pptx
@@ -6,7 +6,8 @@
   </p:sldMasterIdLst>
   <p:sldIdLst>
     <p:sldId id="256" r:id="rId2"/>
-    <p:sldId id="257" r:id="rId3"/>
+    <p:sldId id="258" r:id="rId3"/>
+    <p:sldId id="257" r:id="rId4"/>
   </p:sldIdLst>
   <p:sldSz cx="12192000" cy="6858000"/>
   <p:notesSz cx="6858000" cy="9144000"/>
@@ -244,7 +245,7 @@
           <a:p>
             <a:fld id="{90EF8CCF-DBDE-4852-99E4-85AC3F1F6A22}" type="datetimeFigureOut">
               <a:rPr lang="en-US" smtClean="0"/>
-              <a:t>4/18/2019</a:t>
+              <a:t>4/20/2019</a:t>
             </a:fld>
             <a:endParaRPr lang="en-US"/>
           </a:p>
@@ -414,7 +415,7 @@
           <a:p>
             <a:fld id="{90EF8CCF-DBDE-4852-99E4-85AC3F1F6A22}" type="datetimeFigureOut">
               <a:rPr lang="en-US" smtClean="0"/>
-              <a:t>4/18/2019</a:t>
+              <a:t>4/20/2019</a:t>
             </a:fld>
             <a:endParaRPr lang="en-US"/>
           </a:p>
@@ -594,7 +595,7 @@
           <a:p>
             <a:fld id="{90EF8CCF-DBDE-4852-99E4-85AC3F1F6A22}" type="datetimeFigureOut">
               <a:rPr lang="en-US" smtClean="0"/>
-              <a:t>4/18/2019</a:t>
+              <a:t>4/20/2019</a:t>
             </a:fld>
             <a:endParaRPr lang="en-US"/>
           </a:p>
@@ -764,7 +765,7 @@
           <a:p>
             <a:fld id="{90EF8CCF-DBDE-4852-99E4-85AC3F1F6A22}" type="datetimeFigureOut">
               <a:rPr lang="en-US" smtClean="0"/>
-              <a:t>4/18/2019</a:t>
+              <a:t>4/20/2019</a:t>
             </a:fld>
             <a:endParaRPr lang="en-US"/>
           </a:p>
@@ -1010,7 +1011,7 @@
           <a:p>
             <a:fld id="{90EF8CCF-DBDE-4852-99E4-85AC3F1F6A22}" type="datetimeFigureOut">
               <a:rPr lang="en-US" smtClean="0"/>
-              <a:t>4/18/2019</a:t>
+              <a:t>4/20/2019</a:t>
             </a:fld>
             <a:endParaRPr lang="en-US"/>
           </a:p>
@@ -1242,7 +1243,7 @@
           <a:p>
             <a:fld id="{90EF8CCF-DBDE-4852-99E4-85AC3F1F6A22}" type="datetimeFigureOut">
               <a:rPr lang="en-US" smtClean="0"/>
-              <a:t>4/18/2019</a:t>
+              <a:t>4/20/2019</a:t>
             </a:fld>
             <a:endParaRPr lang="en-US"/>
           </a:p>
@@ -1609,7 +1610,7 @@
           <a:p>
             <a:fld id="{90EF8CCF-DBDE-4852-99E4-85AC3F1F6A22}" type="datetimeFigureOut">
               <a:rPr lang="en-US" smtClean="0"/>
-              <a:t>4/18/2019</a:t>
+              <a:t>4/20/2019</a:t>
             </a:fld>
             <a:endParaRPr lang="en-US"/>
           </a:p>
@@ -1727,7 +1728,7 @@
           <a:p>
             <a:fld id="{90EF8CCF-DBDE-4852-99E4-85AC3F1F6A22}" type="datetimeFigureOut">
               <a:rPr lang="en-US" smtClean="0"/>
-              <a:t>4/18/2019</a:t>
+              <a:t>4/20/2019</a:t>
             </a:fld>
             <a:endParaRPr lang="en-US"/>
           </a:p>
@@ -1822,7 +1823,7 @@
           <a:p>
             <a:fld id="{90EF8CCF-DBDE-4852-99E4-85AC3F1F6A22}" type="datetimeFigureOut">
               <a:rPr lang="en-US" smtClean="0"/>
-              <a:t>4/18/2019</a:t>
+              <a:t>4/20/2019</a:t>
             </a:fld>
             <a:endParaRPr lang="en-US"/>
           </a:p>
@@ -2099,7 +2100,7 @@
           <a:p>
             <a:fld id="{90EF8CCF-DBDE-4852-99E4-85AC3F1F6A22}" type="datetimeFigureOut">
               <a:rPr lang="en-US" smtClean="0"/>
-              <a:t>4/18/2019</a:t>
+              <a:t>4/20/2019</a:t>
             </a:fld>
             <a:endParaRPr lang="en-US"/>
           </a:p>
@@ -2352,7 +2353,7 @@
           <a:p>
             <a:fld id="{90EF8CCF-DBDE-4852-99E4-85AC3F1F6A22}" type="datetimeFigureOut">
               <a:rPr lang="en-US" smtClean="0"/>
-              <a:t>4/18/2019</a:t>
+              <a:t>4/20/2019</a:t>
             </a:fld>
             <a:endParaRPr lang="en-US"/>
           </a:p>
@@ -2565,7 +2566,7 @@
           <a:p>
             <a:fld id="{90EF8CCF-DBDE-4852-99E4-85AC3F1F6A22}" type="datetimeFigureOut">
               <a:rPr lang="en-US" smtClean="0"/>
-              <a:t>4/18/2019</a:t>
+              <a:t>4/20/2019</a:t>
             </a:fld>
             <a:endParaRPr lang="en-US"/>
           </a:p>
@@ -4390,6 +4391,397 @@
           <a:chExt cx="0" cy="0"/>
         </a:xfrm>
       </p:grpSpPr>
+      <p:cxnSp>
+        <p:nvCxnSpPr>
+          <p:cNvPr id="55" name="Conector recto 54"/>
+          <p:cNvCxnSpPr/>
+          <p:nvPr/>
+        </p:nvCxnSpPr>
+        <p:spPr>
+          <a:xfrm>
+            <a:off x="539424" y="939010"/>
+            <a:ext cx="4356000" cy="0"/>
+          </a:xfrm>
+          <a:prstGeom prst="line">
+            <a:avLst/>
+          </a:prstGeom>
+          <a:ln w="38100">
+            <a:solidFill>
+              <a:srgbClr val="E1E71B"/>
+            </a:solidFill>
+          </a:ln>
+        </p:spPr>
+        <p:style>
+          <a:lnRef idx="1">
+            <a:schemeClr val="accent1"/>
+          </a:lnRef>
+          <a:fillRef idx="0">
+            <a:schemeClr val="accent1"/>
+          </a:fillRef>
+          <a:effectRef idx="0">
+            <a:schemeClr val="accent1"/>
+          </a:effectRef>
+          <a:fontRef idx="minor">
+            <a:schemeClr val="tx1"/>
+          </a:fontRef>
+        </p:style>
+      </p:cxnSp>
+      <p:sp>
+        <p:nvSpPr>
+          <p:cNvPr id="53" name="CuadroTexto 52"/>
+          <p:cNvSpPr txBox="1"/>
+          <p:nvPr/>
+        </p:nvSpPr>
+        <p:spPr>
+          <a:xfrm>
+            <a:off x="426000" y="504000"/>
+            <a:ext cx="5400000" cy="523220"/>
+          </a:xfrm>
+          <a:prstGeom prst="rect">
+            <a:avLst/>
+          </a:prstGeom>
+          <a:noFill/>
+        </p:spPr>
+        <p:txBody>
+          <a:bodyPr wrap="square" rtlCol="0">
+            <a:spAutoFit/>
+          </a:bodyPr>
+          <a:lstStyle/>
+          <a:p>
+            <a:r>
+              <a:rPr lang="es-ES" sz="2800" dirty="0" smtClean="0">
+                <a:solidFill>
+                  <a:schemeClr val="tx1">
+                    <a:lumMod val="65000"/>
+                    <a:lumOff val="35000"/>
+                  </a:schemeClr>
+                </a:solidFill>
+                <a:latin typeface="Lato" panose="020F0502020204030203" pitchFamily="34" charset="0"/>
+              </a:rPr>
+              <a:t>Configuración plantilla Excel</a:t>
+            </a:r>
+            <a:endParaRPr lang="en-US" sz="2800" dirty="0">
+              <a:solidFill>
+                <a:schemeClr val="tx1">
+                  <a:lumMod val="65000"/>
+                  <a:lumOff val="35000"/>
+                </a:schemeClr>
+              </a:solidFill>
+              <a:latin typeface="Lato" panose="020F0502020204030203" pitchFamily="34" charset="0"/>
+            </a:endParaRPr>
+          </a:p>
+        </p:txBody>
+      </p:sp>
+      <p:sp>
+        <p:nvSpPr>
+          <p:cNvPr id="56" name="CuadroTexto 55"/>
+          <p:cNvSpPr txBox="1"/>
+          <p:nvPr/>
+        </p:nvSpPr>
+        <p:spPr>
+          <a:xfrm>
+            <a:off x="4836000" y="5769000"/>
+            <a:ext cx="5400000" cy="461665"/>
+          </a:xfrm>
+          <a:prstGeom prst="rect">
+            <a:avLst/>
+          </a:prstGeom>
+          <a:noFill/>
+        </p:spPr>
+        <p:txBody>
+          <a:bodyPr wrap="square" rtlCol="0">
+            <a:spAutoFit/>
+          </a:bodyPr>
+          <a:lstStyle/>
+          <a:p>
+            <a:r>
+              <a:rPr lang="es-ES" sz="2400" dirty="0" smtClean="0">
+                <a:solidFill>
+                  <a:schemeClr val="tx1">
+                    <a:lumMod val="65000"/>
+                    <a:lumOff val="35000"/>
+                  </a:schemeClr>
+                </a:solidFill>
+                <a:latin typeface="Montserrat" panose="02000505000000020004" pitchFamily="2" charset="0"/>
+              </a:rPr>
+              <a:t>Configuración plantilla Excel</a:t>
+            </a:r>
+            <a:endParaRPr lang="en-US" sz="2400" dirty="0">
+              <a:solidFill>
+                <a:schemeClr val="tx1">
+                  <a:lumMod val="65000"/>
+                  <a:lumOff val="35000"/>
+                </a:schemeClr>
+              </a:solidFill>
+              <a:latin typeface="Montserrat" panose="02000505000000020004" pitchFamily="2" charset="0"/>
+            </a:endParaRPr>
+          </a:p>
+        </p:txBody>
+      </p:sp>
+      <p:sp>
+        <p:nvSpPr>
+          <p:cNvPr id="58" name="CuadroTexto 57"/>
+          <p:cNvSpPr txBox="1"/>
+          <p:nvPr/>
+        </p:nvSpPr>
+        <p:spPr>
+          <a:xfrm>
+            <a:off x="2856000" y="2484000"/>
+            <a:ext cx="1800000" cy="400110"/>
+          </a:xfrm>
+          <a:prstGeom prst="rect">
+            <a:avLst/>
+          </a:prstGeom>
+          <a:solidFill>
+            <a:srgbClr val="E1E71B"/>
+          </a:solidFill>
+        </p:spPr>
+        <p:txBody>
+          <a:bodyPr wrap="square" rtlCol="0">
+            <a:spAutoFit/>
+          </a:bodyPr>
+          <a:lstStyle/>
+          <a:p>
+            <a:pPr algn="ctr"/>
+            <a:r>
+              <a:rPr lang="es-ES" sz="2000" dirty="0" smtClean="0">
+                <a:solidFill>
+                  <a:schemeClr val="tx1">
+                    <a:lumMod val="65000"/>
+                    <a:lumOff val="35000"/>
+                  </a:schemeClr>
+                </a:solidFill>
+                <a:latin typeface="Lato" panose="020F0502020204030203" pitchFamily="34" charset="0"/>
+              </a:rPr>
+              <a:t>      Guardar</a:t>
+            </a:r>
+            <a:endParaRPr lang="en-US" sz="2000" dirty="0">
+              <a:solidFill>
+                <a:schemeClr val="tx1">
+                  <a:lumMod val="65000"/>
+                  <a:lumOff val="35000"/>
+                </a:schemeClr>
+              </a:solidFill>
+              <a:latin typeface="Lato" panose="020F0502020204030203" pitchFamily="34" charset="0"/>
+            </a:endParaRPr>
+          </a:p>
+        </p:txBody>
+      </p:sp>
+      <p:sp>
+        <p:nvSpPr>
+          <p:cNvPr id="60" name="CuadroTexto 59"/>
+          <p:cNvSpPr txBox="1"/>
+          <p:nvPr/>
+        </p:nvSpPr>
+        <p:spPr>
+          <a:xfrm>
+            <a:off x="9831000" y="5868780"/>
+            <a:ext cx="1800000" cy="360000"/>
+          </a:xfrm>
+          <a:prstGeom prst="rect">
+            <a:avLst/>
+          </a:prstGeom>
+          <a:solidFill>
+            <a:srgbClr val="231B35"/>
+          </a:solidFill>
+        </p:spPr>
+        <p:txBody>
+          <a:bodyPr wrap="square" rtlCol="0">
+            <a:spAutoFit/>
+          </a:bodyPr>
+          <a:lstStyle/>
+          <a:p>
+            <a:pPr algn="ctr"/>
+            <a:r>
+              <a:rPr lang="es-ES" sz="2000" dirty="0" smtClean="0">
+                <a:solidFill>
+                  <a:schemeClr val="bg1">
+                    <a:lumMod val="95000"/>
+                  </a:schemeClr>
+                </a:solidFill>
+                <a:latin typeface="Lato" panose="020F0502020204030203" pitchFamily="34" charset="0"/>
+              </a:rPr>
+              <a:t>Cancelar</a:t>
+            </a:r>
+            <a:endParaRPr lang="en-US" sz="2000" dirty="0">
+              <a:solidFill>
+                <a:schemeClr val="bg1">
+                  <a:lumMod val="95000"/>
+                </a:schemeClr>
+              </a:solidFill>
+              <a:latin typeface="Lato" panose="020F0502020204030203" pitchFamily="34" charset="0"/>
+            </a:endParaRPr>
+          </a:p>
+        </p:txBody>
+      </p:sp>
+      <p:pic>
+        <p:nvPicPr>
+          <p:cNvPr id="1026" name="Picture 2" descr="User-Interface-Save-As icon"/>
+          <p:cNvPicPr>
+            <a:picLocks noChangeAspect="1" noChangeArrowheads="1"/>
+          </p:cNvPicPr>
+          <p:nvPr/>
+        </p:nvPicPr>
+        <p:blipFill>
+          <a:blip r:embed="rId2" cstate="print">
+            <a:extLst>
+              <a:ext uri="{28A0092B-C50C-407E-A947-70E740481C1C}">
+                <a14:useLocalDpi xmlns:a14="http://schemas.microsoft.com/office/drawing/2010/main" val="0"/>
+              </a:ext>
+            </a:extLst>
+          </a:blip>
+          <a:srcRect/>
+          <a:stretch>
+            <a:fillRect/>
+          </a:stretch>
+        </p:blipFill>
+        <p:spPr bwMode="auto">
+          <a:xfrm>
+            <a:off x="2987939" y="2552066"/>
+            <a:ext cx="275023" cy="275023"/>
+          </a:xfrm>
+          <a:prstGeom prst="rect">
+            <a:avLst/>
+          </a:prstGeom>
+          <a:noFill/>
+          <a:extLst>
+            <a:ext uri="{909E8E84-426E-40DD-AFC4-6F175D3DCCD1}">
+              <a14:hiddenFill xmlns:a14="http://schemas.microsoft.com/office/drawing/2010/main">
+                <a:solidFill>
+                  <a:srgbClr val="FFFFFF"/>
+                </a:solidFill>
+              </a14:hiddenFill>
+            </a:ext>
+          </a:extLst>
+        </p:spPr>
+      </p:pic>
+      <p:sp>
+        <p:nvSpPr>
+          <p:cNvPr id="44" name="CuadroTexto 43"/>
+          <p:cNvSpPr txBox="1"/>
+          <p:nvPr/>
+        </p:nvSpPr>
+        <p:spPr>
+          <a:xfrm>
+            <a:off x="6141000" y="2552066"/>
+            <a:ext cx="1350000" cy="276999"/>
+          </a:xfrm>
+          <a:prstGeom prst="rect">
+            <a:avLst/>
+          </a:prstGeom>
+          <a:solidFill>
+            <a:srgbClr val="E1E71B"/>
+          </a:solidFill>
+        </p:spPr>
+        <p:txBody>
+          <a:bodyPr wrap="square" rtlCol="0">
+            <a:spAutoFit/>
+          </a:bodyPr>
+          <a:lstStyle/>
+          <a:p>
+            <a:pPr algn="ctr"/>
+            <a:r>
+              <a:rPr lang="es-ES" sz="1200" b="1" dirty="0" smtClean="0">
+                <a:solidFill>
+                  <a:schemeClr val="tx1">
+                    <a:lumMod val="65000"/>
+                    <a:lumOff val="35000"/>
+                  </a:schemeClr>
+                </a:solidFill>
+                <a:latin typeface="Lato" panose="020F0502020204030203" pitchFamily="34" charset="0"/>
+              </a:rPr>
+              <a:t>         GUARDAR</a:t>
+            </a:r>
+            <a:endParaRPr lang="en-US" sz="1200" b="1" dirty="0">
+              <a:solidFill>
+                <a:schemeClr val="tx1">
+                  <a:lumMod val="65000"/>
+                  <a:lumOff val="35000"/>
+                </a:schemeClr>
+              </a:solidFill>
+              <a:latin typeface="Lato" panose="020F0502020204030203" pitchFamily="34" charset="0"/>
+            </a:endParaRPr>
+          </a:p>
+        </p:txBody>
+      </p:sp>
+      <p:pic>
+        <p:nvPicPr>
+          <p:cNvPr id="50" name="Picture 2" descr="User-Interface-Save-As icon"/>
+          <p:cNvPicPr>
+            <a:picLocks noChangeAspect="1" noChangeArrowheads="1"/>
+          </p:cNvPicPr>
+          <p:nvPr/>
+        </p:nvPicPr>
+        <p:blipFill>
+          <a:blip r:embed="rId3" cstate="print">
+            <a:extLst>
+              <a:ext uri="{28A0092B-C50C-407E-A947-70E740481C1C}">
+                <a14:useLocalDpi xmlns:a14="http://schemas.microsoft.com/office/drawing/2010/main" val="0"/>
+              </a:ext>
+            </a:extLst>
+          </a:blip>
+          <a:srcRect/>
+          <a:stretch>
+            <a:fillRect/>
+          </a:stretch>
+        </p:blipFill>
+        <p:spPr bwMode="auto">
+          <a:xfrm>
+            <a:off x="6227448" y="2588699"/>
+            <a:ext cx="206630" cy="206630"/>
+          </a:xfrm>
+          <a:prstGeom prst="rect">
+            <a:avLst/>
+          </a:prstGeom>
+          <a:noFill/>
+          <a:extLst>
+            <a:ext uri="{909E8E84-426E-40DD-AFC4-6F175D3DCCD1}">
+              <a14:hiddenFill xmlns:a14="http://schemas.microsoft.com/office/drawing/2010/main">
+                <a:solidFill>
+                  <a:srgbClr val="FFFFFF"/>
+                </a:solidFill>
+              </a14:hiddenFill>
+            </a:ext>
+          </a:extLst>
+        </p:spPr>
+      </p:pic>
+    </p:spTree>
+    <p:extLst>
+      <p:ext uri="{BB962C8B-B14F-4D97-AF65-F5344CB8AC3E}">
+        <p14:creationId xmlns:p14="http://schemas.microsoft.com/office/powerpoint/2010/main" val="3439810572"/>
+      </p:ext>
+    </p:extLst>
+  </p:cSld>
+  <p:clrMapOvr>
+    <a:masterClrMapping/>
+  </p:clrMapOvr>
+  <p:timing>
+    <p:tnLst>
+      <p:par>
+        <p:cTn id="1" dur="indefinite" restart="never" nodeType="tmRoot"/>
+      </p:par>
+    </p:tnLst>
+  </p:timing>
+</p:sld>
+</file>
+
+<file path=ppt/slides/slide3.xml><?xml version="1.0" encoding="utf-8"?>
+<p:sld xmlns:a="http://schemas.openxmlformats.org/drawingml/2006/main" xmlns:r="http://schemas.openxmlformats.org/officeDocument/2006/relationships" xmlns:p="http://schemas.openxmlformats.org/presentationml/2006/main">
+  <p:cSld>
+    <p:spTree>
+      <p:nvGrpSpPr>
+        <p:cNvPr id="1" name=""/>
+        <p:cNvGrpSpPr/>
+        <p:nvPr/>
+      </p:nvGrpSpPr>
+      <p:grpSpPr>
+        <a:xfrm>
+          <a:off x="0" y="0"/>
+          <a:ext cx="0" cy="0"/>
+          <a:chOff x="0" y="0"/>
+          <a:chExt cx="0" cy="0"/>
+        </a:xfrm>
+      </p:grpSpPr>
       <p:sp>
         <p:nvSpPr>
           <p:cNvPr id="5" name="Rectángulo 4"/>
@@ -4530,16 +4922,7 @@
                 </a:solidFill>
                 <a:latin typeface="Lato" panose="020F0502020204030203" pitchFamily="34" charset="0"/>
               </a:rPr>
-              <a:t>Gesti</a:t>
-            </a:r>
-            <a:r>
-              <a:rPr lang="es-ES" sz="2000" dirty="0" smtClean="0">
-                <a:solidFill>
-                  <a:srgbClr val="E1E71B"/>
-                </a:solidFill>
-                <a:latin typeface="Lato" panose="020F0502020204030203" pitchFamily="34" charset="0"/>
-              </a:rPr>
-              <a:t>ón de novedades</a:t>
+              <a:t>Gestión de novedades</a:t>
             </a:r>
             <a:endParaRPr lang="en-US" sz="2000" dirty="0">
               <a:solidFill>

</xml_diff>

<commit_message>
Ajustes para generar alertas en el reporte
</commit_message>
<xml_diff>
--- a/designs/Designs.pptx
+++ b/designs/Designs.pptx
@@ -248,7 +248,7 @@
           <a:p>
             <a:fld id="{90EF8CCF-DBDE-4852-99E4-85AC3F1F6A22}" type="datetimeFigureOut">
               <a:rPr lang="en-US" smtClean="0"/>
-              <a:t>4/20/2019</a:t>
+              <a:t>4/26/2019</a:t>
             </a:fld>
             <a:endParaRPr lang="en-US"/>
           </a:p>
@@ -418,7 +418,7 @@
           <a:p>
             <a:fld id="{90EF8CCF-DBDE-4852-99E4-85AC3F1F6A22}" type="datetimeFigureOut">
               <a:rPr lang="en-US" smtClean="0"/>
-              <a:t>4/20/2019</a:t>
+              <a:t>4/26/2019</a:t>
             </a:fld>
             <a:endParaRPr lang="en-US"/>
           </a:p>
@@ -598,7 +598,7 @@
           <a:p>
             <a:fld id="{90EF8CCF-DBDE-4852-99E4-85AC3F1F6A22}" type="datetimeFigureOut">
               <a:rPr lang="en-US" smtClean="0"/>
-              <a:t>4/20/2019</a:t>
+              <a:t>4/26/2019</a:t>
             </a:fld>
             <a:endParaRPr lang="en-US"/>
           </a:p>
@@ -768,7 +768,7 @@
           <a:p>
             <a:fld id="{90EF8CCF-DBDE-4852-99E4-85AC3F1F6A22}" type="datetimeFigureOut">
               <a:rPr lang="en-US" smtClean="0"/>
-              <a:t>4/20/2019</a:t>
+              <a:t>4/26/2019</a:t>
             </a:fld>
             <a:endParaRPr lang="en-US"/>
           </a:p>
@@ -1014,7 +1014,7 @@
           <a:p>
             <a:fld id="{90EF8CCF-DBDE-4852-99E4-85AC3F1F6A22}" type="datetimeFigureOut">
               <a:rPr lang="en-US" smtClean="0"/>
-              <a:t>4/20/2019</a:t>
+              <a:t>4/26/2019</a:t>
             </a:fld>
             <a:endParaRPr lang="en-US"/>
           </a:p>
@@ -1246,7 +1246,7 @@
           <a:p>
             <a:fld id="{90EF8CCF-DBDE-4852-99E4-85AC3F1F6A22}" type="datetimeFigureOut">
               <a:rPr lang="en-US" smtClean="0"/>
-              <a:t>4/20/2019</a:t>
+              <a:t>4/26/2019</a:t>
             </a:fld>
             <a:endParaRPr lang="en-US"/>
           </a:p>
@@ -1613,7 +1613,7 @@
           <a:p>
             <a:fld id="{90EF8CCF-DBDE-4852-99E4-85AC3F1F6A22}" type="datetimeFigureOut">
               <a:rPr lang="en-US" smtClean="0"/>
-              <a:t>4/20/2019</a:t>
+              <a:t>4/26/2019</a:t>
             </a:fld>
             <a:endParaRPr lang="en-US"/>
           </a:p>
@@ -1731,7 +1731,7 @@
           <a:p>
             <a:fld id="{90EF8CCF-DBDE-4852-99E4-85AC3F1F6A22}" type="datetimeFigureOut">
               <a:rPr lang="en-US" smtClean="0"/>
-              <a:t>4/20/2019</a:t>
+              <a:t>4/26/2019</a:t>
             </a:fld>
             <a:endParaRPr lang="en-US"/>
           </a:p>
@@ -1826,7 +1826,7 @@
           <a:p>
             <a:fld id="{90EF8CCF-DBDE-4852-99E4-85AC3F1F6A22}" type="datetimeFigureOut">
               <a:rPr lang="en-US" smtClean="0"/>
-              <a:t>4/20/2019</a:t>
+              <a:t>4/26/2019</a:t>
             </a:fld>
             <a:endParaRPr lang="en-US"/>
           </a:p>
@@ -2103,7 +2103,7 @@
           <a:p>
             <a:fld id="{90EF8CCF-DBDE-4852-99E4-85AC3F1F6A22}" type="datetimeFigureOut">
               <a:rPr lang="en-US" smtClean="0"/>
-              <a:t>4/20/2019</a:t>
+              <a:t>4/26/2019</a:t>
             </a:fld>
             <a:endParaRPr lang="en-US"/>
           </a:p>
@@ -2356,7 +2356,7 @@
           <a:p>
             <a:fld id="{90EF8CCF-DBDE-4852-99E4-85AC3F1F6A22}" type="datetimeFigureOut">
               <a:rPr lang="en-US" smtClean="0"/>
-              <a:t>4/20/2019</a:t>
+              <a:t>4/26/2019</a:t>
             </a:fld>
             <a:endParaRPr lang="en-US"/>
           </a:p>
@@ -2569,7 +2569,7 @@
           <a:p>
             <a:fld id="{90EF8CCF-DBDE-4852-99E4-85AC3F1F6A22}" type="datetimeFigureOut">
               <a:rPr lang="en-US" smtClean="0"/>
-              <a:t>4/20/2019</a:t>
+              <a:t>4/26/2019</a:t>
             </a:fld>
             <a:endParaRPr lang="en-US"/>
           </a:p>
@@ -4357,6 +4357,29 @@
           </a:prstGeom>
         </p:spPr>
       </p:pic>
+      <p:pic>
+        <p:nvPicPr>
+          <p:cNvPr id="43" name="Imagen 42"/>
+          <p:cNvPicPr>
+            <a:picLocks noChangeAspect="1"/>
+          </p:cNvPicPr>
+          <p:nvPr/>
+        </p:nvPicPr>
+        <p:blipFill rotWithShape="1">
+          <a:blip r:embed="rId3"/>
+          <a:srcRect l="28228" t="21316" r="20640" b="49723"/>
+          <a:stretch/>
+        </p:blipFill>
+        <p:spPr>
+          <a:xfrm>
+            <a:off x="6752126" y="3275126"/>
+            <a:ext cx="205741" cy="144781"/>
+          </a:xfrm>
+          <a:prstGeom prst="rect">
+            <a:avLst/>
+          </a:prstGeom>
+        </p:spPr>
+      </p:pic>
     </p:spTree>
     <p:extLst>
       <p:ext uri="{BB962C8B-B14F-4D97-AF65-F5344CB8AC3E}">
@@ -4769,19 +4792,7 @@
                 </a:solidFill>
                 <a:latin typeface="Lato" panose="020F0502020204030203" pitchFamily="34" charset="0"/>
               </a:rPr>
-              <a:t>      </a:t>
-            </a:r>
-            <a:r>
-              <a:rPr lang="es-ES" sz="2000" dirty="0" smtClean="0">
-                <a:solidFill>
-                  <a:schemeClr val="tx1">
-                    <a:lumMod val="65000"/>
-                    <a:lumOff val="35000"/>
-                  </a:schemeClr>
-                </a:solidFill>
-                <a:latin typeface="Lato" panose="020F0502020204030203" pitchFamily="34" charset="0"/>
-              </a:rPr>
-              <a:t>Procesar novedades</a:t>
+              <a:t>      Procesar novedades</a:t>
             </a:r>
             <a:endParaRPr lang="en-US" sz="2000" dirty="0">
               <a:solidFill>
@@ -4959,19 +4970,7 @@
                 </a:solidFill>
                 <a:latin typeface="Lato" panose="020F0502020204030203" pitchFamily="34" charset="0"/>
               </a:rPr>
-              <a:t>      </a:t>
-            </a:r>
-            <a:r>
-              <a:rPr lang="es-ES" sz="2000" dirty="0" smtClean="0">
-                <a:solidFill>
-                  <a:schemeClr val="tx1">
-                    <a:lumMod val="65000"/>
-                    <a:lumOff val="35000"/>
-                  </a:schemeClr>
-                </a:solidFill>
-                <a:latin typeface="Lato" panose="020F0502020204030203" pitchFamily="34" charset="0"/>
-              </a:rPr>
-              <a:t>Procesar novedades</a:t>
+              <a:t>      Procesar novedades</a:t>
             </a:r>
             <a:endParaRPr lang="en-US" sz="2000" dirty="0">
               <a:solidFill>
@@ -6338,19 +6337,7 @@
                 </a:solidFill>
                 <a:latin typeface="Lato" panose="020F0502020204030203" pitchFamily="34" charset="0"/>
               </a:rPr>
-              <a:t>Configuración </a:t>
-            </a:r>
-            <a:r>
-              <a:rPr lang="es-ES" sz="2000" dirty="0" smtClean="0">
-                <a:solidFill>
-                  <a:schemeClr val="tx1">
-                    <a:lumMod val="65000"/>
-                    <a:lumOff val="35000"/>
-                  </a:schemeClr>
-                </a:solidFill>
-                <a:latin typeface="Lato" panose="020F0502020204030203" pitchFamily="34" charset="0"/>
-              </a:rPr>
-              <a:t>jornada diurna/nocturna</a:t>
+              <a:t>Configuración jornada diurna/nocturna</a:t>
             </a:r>
             <a:endParaRPr lang="en-US" sz="2000" dirty="0">
               <a:solidFill>
@@ -6445,19 +6432,7 @@
                 </a:solidFill>
                 <a:latin typeface="Lato" panose="020F0502020204030203" pitchFamily="34" charset="0"/>
               </a:rPr>
-              <a:t>      </a:t>
-            </a:r>
-            <a:r>
-              <a:rPr lang="es-ES" sz="2000" dirty="0" smtClean="0">
-                <a:solidFill>
-                  <a:schemeClr val="tx1">
-                    <a:lumMod val="65000"/>
-                    <a:lumOff val="35000"/>
-                  </a:schemeClr>
-                </a:solidFill>
-                <a:latin typeface="Lato" panose="020F0502020204030203" pitchFamily="34" charset="0"/>
-              </a:rPr>
-              <a:t>Guardar</a:t>
+              <a:t>      Guardar</a:t>
             </a:r>
             <a:endParaRPr lang="en-US" sz="2000" dirty="0">
               <a:solidFill>

</xml_diff>

<commit_message>
Reporte horas extras diarias
</commit_message>
<xml_diff>
--- a/designs/Designs.pptx
+++ b/designs/Designs.pptx
@@ -249,7 +249,7 @@
           <a:p>
             <a:fld id="{90EF8CCF-DBDE-4852-99E4-85AC3F1F6A22}" type="datetimeFigureOut">
               <a:rPr lang="en-US" smtClean="0"/>
-              <a:t>9/21/2019</a:t>
+              <a:t>2/16/2020</a:t>
             </a:fld>
             <a:endParaRPr lang="en-US"/>
           </a:p>
@@ -419,7 +419,7 @@
           <a:p>
             <a:fld id="{90EF8CCF-DBDE-4852-99E4-85AC3F1F6A22}" type="datetimeFigureOut">
               <a:rPr lang="en-US" smtClean="0"/>
-              <a:t>9/21/2019</a:t>
+              <a:t>2/16/2020</a:t>
             </a:fld>
             <a:endParaRPr lang="en-US"/>
           </a:p>
@@ -599,7 +599,7 @@
           <a:p>
             <a:fld id="{90EF8CCF-DBDE-4852-99E4-85AC3F1F6A22}" type="datetimeFigureOut">
               <a:rPr lang="en-US" smtClean="0"/>
-              <a:t>9/21/2019</a:t>
+              <a:t>2/16/2020</a:t>
             </a:fld>
             <a:endParaRPr lang="en-US"/>
           </a:p>
@@ -769,7 +769,7 @@
           <a:p>
             <a:fld id="{90EF8CCF-DBDE-4852-99E4-85AC3F1F6A22}" type="datetimeFigureOut">
               <a:rPr lang="en-US" smtClean="0"/>
-              <a:t>9/21/2019</a:t>
+              <a:t>2/16/2020</a:t>
             </a:fld>
             <a:endParaRPr lang="en-US"/>
           </a:p>
@@ -1015,7 +1015,7 @@
           <a:p>
             <a:fld id="{90EF8CCF-DBDE-4852-99E4-85AC3F1F6A22}" type="datetimeFigureOut">
               <a:rPr lang="en-US" smtClean="0"/>
-              <a:t>9/21/2019</a:t>
+              <a:t>2/16/2020</a:t>
             </a:fld>
             <a:endParaRPr lang="en-US"/>
           </a:p>
@@ -1247,7 +1247,7 @@
           <a:p>
             <a:fld id="{90EF8CCF-DBDE-4852-99E4-85AC3F1F6A22}" type="datetimeFigureOut">
               <a:rPr lang="en-US" smtClean="0"/>
-              <a:t>9/21/2019</a:t>
+              <a:t>2/16/2020</a:t>
             </a:fld>
             <a:endParaRPr lang="en-US"/>
           </a:p>
@@ -1614,7 +1614,7 @@
           <a:p>
             <a:fld id="{90EF8CCF-DBDE-4852-99E4-85AC3F1F6A22}" type="datetimeFigureOut">
               <a:rPr lang="en-US" smtClean="0"/>
-              <a:t>9/21/2019</a:t>
+              <a:t>2/16/2020</a:t>
             </a:fld>
             <a:endParaRPr lang="en-US"/>
           </a:p>
@@ -1732,7 +1732,7 @@
           <a:p>
             <a:fld id="{90EF8CCF-DBDE-4852-99E4-85AC3F1F6A22}" type="datetimeFigureOut">
               <a:rPr lang="en-US" smtClean="0"/>
-              <a:t>9/21/2019</a:t>
+              <a:t>2/16/2020</a:t>
             </a:fld>
             <a:endParaRPr lang="en-US"/>
           </a:p>
@@ -1827,7 +1827,7 @@
           <a:p>
             <a:fld id="{90EF8CCF-DBDE-4852-99E4-85AC3F1F6A22}" type="datetimeFigureOut">
               <a:rPr lang="en-US" smtClean="0"/>
-              <a:t>9/21/2019</a:t>
+              <a:t>2/16/2020</a:t>
             </a:fld>
             <a:endParaRPr lang="en-US"/>
           </a:p>
@@ -2104,7 +2104,7 @@
           <a:p>
             <a:fld id="{90EF8CCF-DBDE-4852-99E4-85AC3F1F6A22}" type="datetimeFigureOut">
               <a:rPr lang="en-US" smtClean="0"/>
-              <a:t>9/21/2019</a:t>
+              <a:t>2/16/2020</a:t>
             </a:fld>
             <a:endParaRPr lang="en-US"/>
           </a:p>
@@ -2357,7 +2357,7 @@
           <a:p>
             <a:fld id="{90EF8CCF-DBDE-4852-99E4-85AC3F1F6A22}" type="datetimeFigureOut">
               <a:rPr lang="en-US" smtClean="0"/>
-              <a:t>9/21/2019</a:t>
+              <a:t>2/16/2020</a:t>
             </a:fld>
             <a:endParaRPr lang="en-US"/>
           </a:p>
@@ -2570,7 +2570,7 @@
           <a:p>
             <a:fld id="{90EF8CCF-DBDE-4852-99E4-85AC3F1F6A22}" type="datetimeFigureOut">
               <a:rPr lang="en-US" smtClean="0"/>
-              <a:t>9/21/2019</a:t>
+              <a:t>2/16/2020</a:t>
             </a:fld>
             <a:endParaRPr lang="en-US"/>
           </a:p>
@@ -4793,7 +4793,19 @@
                 </a:solidFill>
                 <a:latin typeface="Lato" panose="020F0502020204030203" pitchFamily="34" charset="0"/>
               </a:rPr>
-              <a:t>      Procesar novedades</a:t>
+              <a:t>      </a:t>
+            </a:r>
+            <a:r>
+              <a:rPr lang="es-ES" sz="2000" dirty="0" smtClean="0">
+                <a:solidFill>
+                  <a:schemeClr val="tx1">
+                    <a:lumMod val="65000"/>
+                    <a:lumOff val="35000"/>
+                  </a:schemeClr>
+                </a:solidFill>
+                <a:latin typeface="Lato" panose="020F0502020204030203" pitchFamily="34" charset="0"/>
+              </a:rPr>
+              <a:t>Generar informe</a:t>
             </a:r>
             <a:endParaRPr lang="en-US" sz="2000" dirty="0">
               <a:solidFill>
@@ -5664,30 +5676,352 @@
           </a:prstGeom>
         </p:spPr>
       </p:pic>
+      <p:sp>
+        <p:nvSpPr>
+          <p:cNvPr id="35" name="Rectángulo 34"/>
+          <p:cNvSpPr/>
+          <p:nvPr/>
+        </p:nvSpPr>
+        <p:spPr>
+          <a:xfrm>
+            <a:off x="8391578" y="3697142"/>
+            <a:ext cx="1125000" cy="630000"/>
+          </a:xfrm>
+          <a:prstGeom prst="rect">
+            <a:avLst/>
+          </a:prstGeom>
+          <a:solidFill>
+            <a:srgbClr val="669900"/>
+          </a:solidFill>
+          <a:ln>
+            <a:noFill/>
+          </a:ln>
+        </p:spPr>
+        <p:style>
+          <a:lnRef idx="2">
+            <a:schemeClr val="accent1">
+              <a:shade val="50000"/>
+            </a:schemeClr>
+          </a:lnRef>
+          <a:fillRef idx="1">
+            <a:schemeClr val="accent1"/>
+          </a:fillRef>
+          <a:effectRef idx="0">
+            <a:schemeClr val="accent1"/>
+          </a:effectRef>
+          <a:fontRef idx="minor">
+            <a:schemeClr val="lt1"/>
+          </a:fontRef>
+        </p:style>
+        <p:txBody>
+          <a:bodyPr rtlCol="0" anchor="ctr"/>
+          <a:lstStyle/>
+          <a:p>
+            <a:pPr algn="ctr"/>
+            <a:endParaRPr lang="en-US"/>
+          </a:p>
+        </p:txBody>
+      </p:sp>
+      <p:sp>
+        <p:nvSpPr>
+          <p:cNvPr id="37" name="CuadroTexto 36"/>
+          <p:cNvSpPr txBox="1"/>
+          <p:nvPr/>
+        </p:nvSpPr>
+        <p:spPr>
+          <a:xfrm>
+            <a:off x="8391578" y="4102142"/>
+            <a:ext cx="1125000" cy="238527"/>
+          </a:xfrm>
+          <a:prstGeom prst="rect">
+            <a:avLst/>
+          </a:prstGeom>
+          <a:noFill/>
+        </p:spPr>
+        <p:txBody>
+          <a:bodyPr wrap="square" rtlCol="0">
+            <a:spAutoFit/>
+          </a:bodyPr>
+          <a:lstStyle/>
+          <a:p>
+            <a:pPr algn="ctr"/>
+            <a:r>
+              <a:rPr lang="es-ES" sz="950" b="1" dirty="0" smtClean="0">
+                <a:solidFill>
+                  <a:sysClr val="windowText" lastClr="000000"/>
+                </a:solidFill>
+              </a:rPr>
+              <a:t>Reporte H. Extras</a:t>
+            </a:r>
+            <a:endParaRPr lang="en-US" sz="950" b="1" dirty="0">
+              <a:solidFill>
+                <a:sysClr val="windowText" lastClr="000000"/>
+              </a:solidFill>
+            </a:endParaRPr>
+          </a:p>
+        </p:txBody>
+      </p:sp>
       <p:pic>
         <p:nvPicPr>
-          <p:cNvPr id="40" name="Imagen 39"/>
+          <p:cNvPr id="5" name="Imagen 4"/>
           <p:cNvPicPr>
             <a:picLocks noChangeAspect="1"/>
           </p:cNvPicPr>
           <p:nvPr/>
         </p:nvPicPr>
         <p:blipFill>
-          <a:blip r:embed="rId15"/>
+          <a:blip r:embed="rId15">
+            <a:extLst>
+              <a:ext uri="{BEBA8EAE-BF5A-486C-A8C5-ECC9F3942E4B}">
+                <a14:imgProps xmlns:a14="http://schemas.microsoft.com/office/drawing/2010/main">
+                  <a14:imgLayer r:embed="rId16">
+                    <a14:imgEffect>
+                      <a14:brightnessContrast bright="100000"/>
+                    </a14:imgEffect>
+                  </a14:imgLayer>
+                </a14:imgProps>
+              </a:ext>
+              <a:ext uri="{28A0092B-C50C-407E-A947-70E740481C1C}">
+                <a14:useLocalDpi xmlns:a14="http://schemas.microsoft.com/office/drawing/2010/main" val="0"/>
+              </a:ext>
+            </a:extLst>
+          </a:blip>
           <a:stretch>
             <a:fillRect/>
           </a:stretch>
         </p:blipFill>
         <p:spPr>
           <a:xfrm>
-            <a:off x="4521000" y="594000"/>
-            <a:ext cx="3811115" cy="233208"/>
+            <a:off x="8795913" y="3757318"/>
+            <a:ext cx="345108" cy="345108"/>
           </a:xfrm>
           <a:prstGeom prst="rect">
             <a:avLst/>
           </a:prstGeom>
         </p:spPr>
       </p:pic>
+      <p:sp>
+        <p:nvSpPr>
+          <p:cNvPr id="46" name="Rectángulo 45"/>
+          <p:cNvSpPr/>
+          <p:nvPr/>
+        </p:nvSpPr>
+        <p:spPr>
+          <a:xfrm>
+            <a:off x="8391578" y="4508806"/>
+            <a:ext cx="1125000" cy="630000"/>
+          </a:xfrm>
+          <a:prstGeom prst="rect">
+            <a:avLst/>
+          </a:prstGeom>
+          <a:solidFill>
+            <a:schemeClr val="tx1">
+              <a:lumMod val="85000"/>
+              <a:lumOff val="15000"/>
+            </a:schemeClr>
+          </a:solidFill>
+          <a:ln>
+            <a:noFill/>
+          </a:ln>
+        </p:spPr>
+        <p:style>
+          <a:lnRef idx="2">
+            <a:schemeClr val="accent1">
+              <a:shade val="50000"/>
+            </a:schemeClr>
+          </a:lnRef>
+          <a:fillRef idx="1">
+            <a:schemeClr val="accent1"/>
+          </a:fillRef>
+          <a:effectRef idx="0">
+            <a:schemeClr val="accent1"/>
+          </a:effectRef>
+          <a:fontRef idx="minor">
+            <a:schemeClr val="lt1"/>
+          </a:fontRef>
+        </p:style>
+        <p:txBody>
+          <a:bodyPr rtlCol="0" anchor="ctr"/>
+          <a:lstStyle/>
+          <a:p>
+            <a:pPr algn="ctr"/>
+            <a:endParaRPr lang="en-US"/>
+          </a:p>
+        </p:txBody>
+      </p:sp>
+      <p:sp>
+        <p:nvSpPr>
+          <p:cNvPr id="47" name="CuadroTexto 46"/>
+          <p:cNvSpPr txBox="1"/>
+          <p:nvPr/>
+        </p:nvSpPr>
+        <p:spPr>
+          <a:xfrm>
+            <a:off x="8339324" y="4913806"/>
+            <a:ext cx="1214422" cy="238527"/>
+          </a:xfrm>
+          <a:prstGeom prst="rect">
+            <a:avLst/>
+          </a:prstGeom>
+          <a:noFill/>
+        </p:spPr>
+        <p:txBody>
+          <a:bodyPr wrap="square" rtlCol="0">
+            <a:spAutoFit/>
+          </a:bodyPr>
+          <a:lstStyle>
+            <a:defPPr>
+              <a:defRPr lang="en-US"/>
+            </a:defPPr>
+            <a:lvl1pPr algn="ctr">
+              <a:defRPr sz="950" b="1">
+                <a:solidFill>
+                  <a:srgbClr val="E1E71B"/>
+                </a:solidFill>
+              </a:defRPr>
+            </a:lvl1pPr>
+          </a:lstStyle>
+          <a:p>
+            <a:r>
+              <a:rPr lang="es-ES" dirty="0"/>
+              <a:t>Gestión Novedades</a:t>
+            </a:r>
+            <a:endParaRPr lang="en-US" dirty="0"/>
+          </a:p>
+        </p:txBody>
+      </p:sp>
+      <p:pic>
+        <p:nvPicPr>
+          <p:cNvPr id="11" name="Imagen 10"/>
+          <p:cNvPicPr>
+            <a:picLocks noChangeAspect="1"/>
+          </p:cNvPicPr>
+          <p:nvPr/>
+        </p:nvPicPr>
+        <p:blipFill>
+          <a:blip r:embed="rId17">
+            <a:extLst>
+              <a:ext uri="{BEBA8EAE-BF5A-486C-A8C5-ECC9F3942E4B}">
+                <a14:imgProps xmlns:a14="http://schemas.microsoft.com/office/drawing/2010/main">
+                  <a14:imgLayer r:embed="rId18">
+                    <a14:imgEffect>
+                      <a14:brightnessContrast bright="100000"/>
+                    </a14:imgEffect>
+                  </a14:imgLayer>
+                </a14:imgProps>
+              </a:ext>
+              <a:ext uri="{28A0092B-C50C-407E-A947-70E740481C1C}">
+                <a14:useLocalDpi xmlns:a14="http://schemas.microsoft.com/office/drawing/2010/main" val="0"/>
+              </a:ext>
+            </a:extLst>
+          </a:blip>
+          <a:stretch>
+            <a:fillRect/>
+          </a:stretch>
+        </p:blipFill>
+        <p:spPr>
+          <a:xfrm>
+            <a:off x="8787203" y="4609044"/>
+            <a:ext cx="304762" cy="304762"/>
+          </a:xfrm>
+          <a:prstGeom prst="rect">
+            <a:avLst/>
+          </a:prstGeom>
+        </p:spPr>
+      </p:pic>
+      <p:cxnSp>
+        <p:nvCxnSpPr>
+          <p:cNvPr id="51" name="Conector recto 50"/>
+          <p:cNvCxnSpPr/>
+          <p:nvPr/>
+        </p:nvCxnSpPr>
+        <p:spPr>
+          <a:xfrm>
+            <a:off x="4480093" y="813915"/>
+            <a:ext cx="4611872" cy="5085"/>
+          </a:xfrm>
+          <a:prstGeom prst="line">
+            <a:avLst/>
+          </a:prstGeom>
+          <a:ln w="38100">
+            <a:solidFill>
+              <a:srgbClr val="E1E71B"/>
+            </a:solidFill>
+          </a:ln>
+        </p:spPr>
+        <p:style>
+          <a:lnRef idx="1">
+            <a:schemeClr val="accent1"/>
+          </a:lnRef>
+          <a:fillRef idx="0">
+            <a:schemeClr val="accent1"/>
+          </a:fillRef>
+          <a:effectRef idx="0">
+            <a:schemeClr val="accent1"/>
+          </a:effectRef>
+          <a:fontRef idx="minor">
+            <a:schemeClr val="tx1"/>
+          </a:fontRef>
+        </p:style>
+      </p:cxnSp>
+      <p:sp>
+        <p:nvSpPr>
+          <p:cNvPr id="52" name="CuadroTexto 51"/>
+          <p:cNvSpPr txBox="1"/>
+          <p:nvPr/>
+        </p:nvSpPr>
+        <p:spPr>
+          <a:xfrm>
+            <a:off x="4395299" y="498915"/>
+            <a:ext cx="4400614" cy="369332"/>
+          </a:xfrm>
+          <a:prstGeom prst="rect">
+            <a:avLst/>
+          </a:prstGeom>
+          <a:noFill/>
+        </p:spPr>
+        <p:txBody>
+          <a:bodyPr wrap="square" rtlCol="0">
+            <a:spAutoFit/>
+          </a:bodyPr>
+          <a:lstStyle/>
+          <a:p>
+            <a:r>
+              <a:rPr lang="es-ES" dirty="0" smtClean="0">
+                <a:solidFill>
+                  <a:schemeClr val="tx1">
+                    <a:lumMod val="65000"/>
+                    <a:lumOff val="35000"/>
+                  </a:schemeClr>
+                </a:solidFill>
+                <a:latin typeface="Lato" panose="020F0502020204030203" pitchFamily="34" charset="0"/>
+              </a:rPr>
+              <a:t>Cargar archivo </a:t>
+            </a:r>
+            <a:r>
+              <a:rPr lang="es-ES" dirty="0" smtClean="0">
+                <a:solidFill>
+                  <a:schemeClr val="tx1">
+                    <a:lumMod val="65000"/>
+                    <a:lumOff val="35000"/>
+                  </a:schemeClr>
+                </a:solidFill>
+                <a:latin typeface="Lato" panose="020F0502020204030203" pitchFamily="34" charset="0"/>
+              </a:rPr>
+              <a:t>de reporte de horas extras</a:t>
+            </a:r>
+            <a:endParaRPr lang="en-US" dirty="0">
+              <a:solidFill>
+                <a:schemeClr val="tx1">
+                  <a:lumMod val="65000"/>
+                  <a:lumOff val="35000"/>
+                </a:schemeClr>
+              </a:solidFill>
+              <a:latin typeface="Lato" panose="020F0502020204030203" pitchFamily="34" charset="0"/>
+            </a:endParaRPr>
+          </a:p>
+        </p:txBody>
+      </p:sp>
     </p:spTree>
     <p:extLst>
       <p:ext uri="{BB962C8B-B14F-4D97-AF65-F5344CB8AC3E}">
@@ -6197,21 +6531,8 @@
                   <a:srgbClr val="006600"/>
                 </a:solidFill>
               </a:rPr>
-              <a:t>Procesando </a:t>
-            </a:r>
-            <a:r>
-              <a:rPr lang="es-ES" sz="2400" i="1" dirty="0" smtClean="0">
-                <a:solidFill>
-                  <a:srgbClr val="006600"/>
-                </a:solidFill>
-              </a:rPr>
-              <a:t>su solicitud … </a:t>
-            </a:r>
-            <a:endParaRPr lang="es-ES" sz="2400" i="1" dirty="0" smtClean="0">
-              <a:solidFill>
-                <a:srgbClr val="006600"/>
-              </a:solidFill>
-            </a:endParaRPr>
+              <a:t>Procesando su solicitud … </a:t>
+            </a:r>
           </a:p>
           <a:p>
             <a:pPr algn="ctr"/>
@@ -6229,15 +6550,7 @@
                   <a:srgbClr val="006600"/>
                 </a:solidFill>
               </a:rPr>
-              <a:t>Espere </a:t>
-            </a:r>
-            <a:r>
-              <a:rPr lang="es-ES" sz="2400" i="1" dirty="0" smtClean="0">
-                <a:solidFill>
-                  <a:srgbClr val="006600"/>
-                </a:solidFill>
-              </a:rPr>
-              <a:t>un momento …</a:t>
+              <a:t>Espere un momento …</a:t>
             </a:r>
             <a:endParaRPr lang="en-US" sz="2400" i="1" dirty="0">
               <a:solidFill>
@@ -7147,6 +7460,133 @@
           </a:prstGeom>
         </p:spPr>
       </p:pic>
+      <p:sp>
+        <p:nvSpPr>
+          <p:cNvPr id="9" name="Rectángulo 8"/>
+          <p:cNvSpPr/>
+          <p:nvPr/>
+        </p:nvSpPr>
+        <p:spPr>
+          <a:xfrm>
+            <a:off x="0" y="784757"/>
+            <a:ext cx="6321000" cy="459000"/>
+          </a:xfrm>
+          <a:prstGeom prst="rect">
+            <a:avLst/>
+          </a:prstGeom>
+          <a:solidFill>
+            <a:srgbClr val="262137"/>
+          </a:solidFill>
+          <a:ln>
+            <a:noFill/>
+          </a:ln>
+        </p:spPr>
+        <p:style>
+          <a:lnRef idx="2">
+            <a:schemeClr val="accent1">
+              <a:shade val="50000"/>
+            </a:schemeClr>
+          </a:lnRef>
+          <a:fillRef idx="1">
+            <a:schemeClr val="accent1"/>
+          </a:fillRef>
+          <a:effectRef idx="0">
+            <a:schemeClr val="accent1"/>
+          </a:effectRef>
+          <a:fontRef idx="minor">
+            <a:schemeClr val="lt1"/>
+          </a:fontRef>
+        </p:style>
+        <p:txBody>
+          <a:bodyPr rtlCol="0" anchor="ctr"/>
+          <a:lstStyle/>
+          <a:p>
+            <a:pPr algn="ctr"/>
+            <a:endParaRPr lang="en-US"/>
+          </a:p>
+        </p:txBody>
+      </p:sp>
+      <p:pic>
+        <p:nvPicPr>
+          <p:cNvPr id="10" name="Picture 2" descr="http://www.quipux.com/img/assets/logo-quipux.png"/>
+          <p:cNvPicPr>
+            <a:picLocks noChangeAspect="1" noChangeArrowheads="1"/>
+          </p:cNvPicPr>
+          <p:nvPr/>
+        </p:nvPicPr>
+        <p:blipFill>
+          <a:blip r:embed="rId2">
+            <a:extLst>
+              <a:ext uri="{28A0092B-C50C-407E-A947-70E740481C1C}">
+                <a14:useLocalDpi xmlns:a14="http://schemas.microsoft.com/office/drawing/2010/main" val="0"/>
+              </a:ext>
+            </a:extLst>
+          </a:blip>
+          <a:srcRect/>
+          <a:stretch>
+            <a:fillRect/>
+          </a:stretch>
+        </p:blipFill>
+        <p:spPr bwMode="auto">
+          <a:xfrm>
+            <a:off x="156000" y="883757"/>
+            <a:ext cx="1487997" cy="270000"/>
+          </a:xfrm>
+          <a:prstGeom prst="rect">
+            <a:avLst/>
+          </a:prstGeom>
+          <a:noFill/>
+          <a:extLst>
+            <a:ext uri="{909E8E84-426E-40DD-AFC4-6F175D3DCCD1}">
+              <a14:hiddenFill xmlns:a14="http://schemas.microsoft.com/office/drawing/2010/main">
+                <a:solidFill>
+                  <a:srgbClr val="FFFFFF"/>
+                </a:solidFill>
+              </a14:hiddenFill>
+            </a:ext>
+          </a:extLst>
+        </p:spPr>
+      </p:pic>
+      <p:sp>
+        <p:nvSpPr>
+          <p:cNvPr id="11" name="CuadroTexto 10"/>
+          <p:cNvSpPr txBox="1"/>
+          <p:nvPr/>
+        </p:nvSpPr>
+        <p:spPr>
+          <a:xfrm>
+            <a:off x="3441000" y="843647"/>
+            <a:ext cx="2835000" cy="400110"/>
+          </a:xfrm>
+          <a:prstGeom prst="rect">
+            <a:avLst/>
+          </a:prstGeom>
+          <a:noFill/>
+        </p:spPr>
+        <p:txBody>
+          <a:bodyPr wrap="square" rtlCol="0">
+            <a:spAutoFit/>
+          </a:bodyPr>
+          <a:lstStyle/>
+          <a:p>
+            <a:r>
+              <a:rPr lang="es-CO" sz="2000" dirty="0" smtClean="0">
+                <a:solidFill>
+                  <a:srgbClr val="E1E71B"/>
+                </a:solidFill>
+                <a:latin typeface="Lato" panose="020F0502020204030203" pitchFamily="34" charset="0"/>
+              </a:rPr>
+              <a:t>Reporte de horas extras</a:t>
+            </a:r>
+            <a:endParaRPr lang="en-US" sz="2000" dirty="0">
+              <a:solidFill>
+                <a:srgbClr val="E1E71B"/>
+              </a:solidFill>
+              <a:latin typeface="Lato" panose="020F0502020204030203" pitchFamily="34" charset="0"/>
+            </a:endParaRPr>
+          </a:p>
+        </p:txBody>
+      </p:sp>
     </p:spTree>
     <p:extLst>
       <p:ext uri="{BB962C8B-B14F-4D97-AF65-F5344CB8AC3E}">

</xml_diff>